<commit_message>
Updated name on powerpoint
</commit_message>
<xml_diff>
--- a/OCR_workshop.pptx
+++ b/OCR_workshop.pptx
@@ -111,6 +111,11 @@
       </a:defRPr>
     </a:lvl9pPr>
   </p:defaultTextStyle>
+  <p:extLst>
+    <p:ext uri="{EFAFB233-063F-42B5-8137-9DF3F51BA10A}">
+      <p15:sldGuideLst xmlns:p15="http://schemas.microsoft.com/office/powerpoint/2012/main"/>
+    </p:ext>
+  </p:extLst>
 </p:presentation>
 </file>
 
@@ -196,7 +201,7 @@
           <a:p>
             <a:fld id="{225B7ABD-19B1-EC4A-9404-29C1D3E394EC}" type="datetimeFigureOut">
               <a:rPr lang="da-DK" smtClean="0"/>
-              <a:t>04.03.2021</a:t>
+              <a:t>25.10.2021</a:t>
             </a:fld>
             <a:endParaRPr lang="da-DK"/>
           </a:p>
@@ -688,7 +693,7 @@
             <a:fld id="{82EDB8D0-98ED-4B86-9D5F-E61ADC70144D}" type="datetimeFigureOut">
               <a:rPr lang="en-US" smtClean="0"/>
               <a:pPr/>
-              <a:t>3/4/21</a:t>
+              <a:t>10/25/21</a:t>
             </a:fld>
             <a:endParaRPr lang="en-US" dirty="0"/>
           </a:p>
@@ -860,7 +865,7 @@
             <a:fld id="{82EDB8D0-98ED-4B86-9D5F-E61ADC70144D}" type="datetimeFigureOut">
               <a:rPr lang="en-US" smtClean="0"/>
               <a:pPr/>
-              <a:t>3/4/21</a:t>
+              <a:t>10/25/21</a:t>
             </a:fld>
             <a:endParaRPr lang="en-US" dirty="0"/>
           </a:p>
@@ -1042,7 +1047,7 @@
             <a:fld id="{82EDB8D0-98ED-4B86-9D5F-E61ADC70144D}" type="datetimeFigureOut">
               <a:rPr lang="en-US" smtClean="0"/>
               <a:pPr/>
-              <a:t>3/4/21</a:t>
+              <a:t>10/25/21</a:t>
             </a:fld>
             <a:endParaRPr lang="en-US" dirty="0"/>
           </a:p>
@@ -1214,7 +1219,7 @@
             <a:fld id="{82EDB8D0-98ED-4B86-9D5F-E61ADC70144D}" type="datetimeFigureOut">
               <a:rPr lang="en-US" smtClean="0"/>
               <a:pPr/>
-              <a:t>3/4/21</a:t>
+              <a:t>10/25/21</a:t>
             </a:fld>
             <a:endParaRPr lang="en-US" dirty="0"/>
           </a:p>
@@ -1462,7 +1467,7 @@
             <a:fld id="{82EDB8D0-98ED-4B86-9D5F-E61ADC70144D}" type="datetimeFigureOut">
               <a:rPr lang="en-US" smtClean="0"/>
               <a:pPr/>
-              <a:t>3/4/21</a:t>
+              <a:t>10/25/21</a:t>
             </a:fld>
             <a:endParaRPr lang="en-US" dirty="0"/>
           </a:p>
@@ -1696,7 +1701,7 @@
             <a:fld id="{82EDB8D0-98ED-4B86-9D5F-E61ADC70144D}" type="datetimeFigureOut">
               <a:rPr lang="en-US" smtClean="0"/>
               <a:pPr/>
-              <a:t>3/4/21</a:t>
+              <a:t>10/25/21</a:t>
             </a:fld>
             <a:endParaRPr lang="en-US" dirty="0"/>
           </a:p>
@@ -2065,7 +2070,7 @@
             <a:fld id="{82EDB8D0-98ED-4B86-9D5F-E61ADC70144D}" type="datetimeFigureOut">
               <a:rPr lang="en-US" smtClean="0"/>
               <a:pPr/>
-              <a:t>3/4/21</a:t>
+              <a:t>10/25/21</a:t>
             </a:fld>
             <a:endParaRPr lang="en-US" dirty="0"/>
           </a:p>
@@ -2185,7 +2190,7 @@
             <a:fld id="{82EDB8D0-98ED-4B86-9D5F-E61ADC70144D}" type="datetimeFigureOut">
               <a:rPr lang="en-US" smtClean="0"/>
               <a:pPr/>
-              <a:t>3/4/21</a:t>
+              <a:t>10/25/21</a:t>
             </a:fld>
             <a:endParaRPr lang="en-US" dirty="0"/>
           </a:p>
@@ -2282,7 +2287,7 @@
             <a:fld id="{82EDB8D0-98ED-4B86-9D5F-E61ADC70144D}" type="datetimeFigureOut">
               <a:rPr lang="en-US" smtClean="0"/>
               <a:pPr/>
-              <a:t>3/4/21</a:t>
+              <a:t>10/25/21</a:t>
             </a:fld>
             <a:endParaRPr lang="en-US" dirty="0"/>
           </a:p>
@@ -2561,7 +2566,7 @@
             <a:fld id="{82EDB8D0-98ED-4B86-9D5F-E61ADC70144D}" type="datetimeFigureOut">
               <a:rPr lang="en-US" smtClean="0"/>
               <a:pPr/>
-              <a:t>3/4/21</a:t>
+              <a:t>10/25/21</a:t>
             </a:fld>
             <a:endParaRPr lang="en-US" dirty="0"/>
           </a:p>
@@ -2820,7 +2825,7 @@
             <a:fld id="{82EDB8D0-98ED-4B86-9D5F-E61ADC70144D}" type="datetimeFigureOut">
               <a:rPr lang="en-US" smtClean="0"/>
               <a:pPr/>
-              <a:t>3/4/21</a:t>
+              <a:t>10/25/21</a:t>
             </a:fld>
             <a:endParaRPr lang="en-US" dirty="0"/>
           </a:p>
@@ -3035,7 +3040,7 @@
             <a:fld id="{82EDB8D0-98ED-4B86-9D5F-E61ADC70144D}" type="datetimeFigureOut">
               <a:rPr lang="en-US" smtClean="0"/>
               <a:pPr/>
-              <a:t>3/4/21</a:t>
+              <a:t>10/25/21</a:t>
             </a:fld>
             <a:endParaRPr lang="en-US" dirty="0"/>
           </a:p>
@@ -3600,7 +3605,7 @@
         <p:spPr>
           <a:xfrm>
             <a:off x="581173" y="5737899"/>
-            <a:ext cx="4976683" cy="369332"/>
+            <a:ext cx="4658968" cy="369332"/>
           </a:xfrm>
           <a:prstGeom prst="rect">
             <a:avLst/>
@@ -3615,7 +3620,15 @@
           <a:p>
             <a:r>
               <a:rPr lang="da-DK" dirty="0"/>
-              <a:t>Victor Harbo Olesen, AU Library, Nobelparken</a:t>
+              <a:t>Victor Harbo </a:t>
+            </a:r>
+            <a:r>
+              <a:rPr lang="da-DK"/>
+              <a:t>Johnston, </a:t>
+            </a:r>
+            <a:r>
+              <a:rPr lang="da-DK" dirty="0"/>
+              <a:t>AU Library, Nobelparken</a:t>
             </a:r>
           </a:p>
         </p:txBody>

</xml_diff>